<commit_message>
added HW linkes to QTP Pix.ppt
</commit_message>
<xml_diff>
--- a/_4 Validation/$Qualification Test Plan/QTP PIX2.pptx
+++ b/_4 Validation/$Qualification Test Plan/QTP PIX2.pptx
@@ -5,7 +5,7 @@
     <p:sldMasterId id="2147483648" r:id="rId1"/>
   </p:sldMasterIdLst>
   <p:notesMasterIdLst>
-    <p:notesMasterId r:id="rId13"/>
+    <p:notesMasterId r:id="rId15"/>
   </p:notesMasterIdLst>
   <p:sldIdLst>
     <p:sldId id="279" r:id="rId2"/>
@@ -19,6 +19,8 @@
     <p:sldId id="277" r:id="rId10"/>
     <p:sldId id="278" r:id="rId11"/>
     <p:sldId id="282" r:id="rId12"/>
+    <p:sldId id="283" r:id="rId13"/>
+    <p:sldId id="284" r:id="rId14"/>
   </p:sldIdLst>
   <p:sldSz cx="12192000" cy="6858000"/>
   <p:notesSz cx="6858000" cy="9144000"/>
@@ -218,7 +220,7 @@
           <a:p>
             <a:fld id="{90B77117-200D-4C24-9444-A3272AC92708}" type="datetimeFigureOut">
               <a:rPr lang="en-US" smtClean="0"/>
-              <a:t>3/20/2025</a:t>
+              <a:t>3/25/2025</a:t>
             </a:fld>
             <a:endParaRPr lang="en-US"/>
           </a:p>
@@ -968,7 +970,7 @@
           <a:p>
             <a:fld id="{C0029B18-9E45-4374-8673-2D4794710B00}" type="datetimeFigureOut">
               <a:rPr lang="en-US" smtClean="0"/>
-              <a:t>3/20/2025</a:t>
+              <a:t>3/25/2025</a:t>
             </a:fld>
             <a:endParaRPr lang="en-US"/>
           </a:p>
@@ -1166,7 +1168,7 @@
           <a:p>
             <a:fld id="{C0029B18-9E45-4374-8673-2D4794710B00}" type="datetimeFigureOut">
               <a:rPr lang="en-US" smtClean="0"/>
-              <a:t>3/20/2025</a:t>
+              <a:t>3/25/2025</a:t>
             </a:fld>
             <a:endParaRPr lang="en-US"/>
           </a:p>
@@ -1374,7 +1376,7 @@
           <a:p>
             <a:fld id="{C0029B18-9E45-4374-8673-2D4794710B00}" type="datetimeFigureOut">
               <a:rPr lang="en-US" smtClean="0"/>
-              <a:t>3/20/2025</a:t>
+              <a:t>3/25/2025</a:t>
             </a:fld>
             <a:endParaRPr lang="en-US"/>
           </a:p>
@@ -1572,7 +1574,7 @@
           <a:p>
             <a:fld id="{C0029B18-9E45-4374-8673-2D4794710B00}" type="datetimeFigureOut">
               <a:rPr lang="en-US" smtClean="0"/>
-              <a:t>3/20/2025</a:t>
+              <a:t>3/25/2025</a:t>
             </a:fld>
             <a:endParaRPr lang="en-US"/>
           </a:p>
@@ -1847,7 +1849,7 @@
           <a:p>
             <a:fld id="{C0029B18-9E45-4374-8673-2D4794710B00}" type="datetimeFigureOut">
               <a:rPr lang="en-US" smtClean="0"/>
-              <a:t>3/20/2025</a:t>
+              <a:t>3/25/2025</a:t>
             </a:fld>
             <a:endParaRPr lang="en-US"/>
           </a:p>
@@ -2112,7 +2114,7 @@
           <a:p>
             <a:fld id="{C0029B18-9E45-4374-8673-2D4794710B00}" type="datetimeFigureOut">
               <a:rPr lang="en-US" smtClean="0"/>
-              <a:t>3/20/2025</a:t>
+              <a:t>3/25/2025</a:t>
             </a:fld>
             <a:endParaRPr lang="en-US"/>
           </a:p>
@@ -2524,7 +2526,7 @@
           <a:p>
             <a:fld id="{C0029B18-9E45-4374-8673-2D4794710B00}" type="datetimeFigureOut">
               <a:rPr lang="en-US" smtClean="0"/>
-              <a:t>3/20/2025</a:t>
+              <a:t>3/25/2025</a:t>
             </a:fld>
             <a:endParaRPr lang="en-US"/>
           </a:p>
@@ -2665,7 +2667,7 @@
           <a:p>
             <a:fld id="{C0029B18-9E45-4374-8673-2D4794710B00}" type="datetimeFigureOut">
               <a:rPr lang="en-US" smtClean="0"/>
-              <a:t>3/20/2025</a:t>
+              <a:t>3/25/2025</a:t>
             </a:fld>
             <a:endParaRPr lang="en-US"/>
           </a:p>
@@ -2778,7 +2780,7 @@
           <a:p>
             <a:fld id="{C0029B18-9E45-4374-8673-2D4794710B00}" type="datetimeFigureOut">
               <a:rPr lang="en-US" smtClean="0"/>
-              <a:t>3/20/2025</a:t>
+              <a:t>3/25/2025</a:t>
             </a:fld>
             <a:endParaRPr lang="en-US"/>
           </a:p>
@@ -3089,7 +3091,7 @@
           <a:p>
             <a:fld id="{C0029B18-9E45-4374-8673-2D4794710B00}" type="datetimeFigureOut">
               <a:rPr lang="en-US" smtClean="0"/>
-              <a:t>3/20/2025</a:t>
+              <a:t>3/25/2025</a:t>
             </a:fld>
             <a:endParaRPr lang="en-US"/>
           </a:p>
@@ -3377,7 +3379,7 @@
           <a:p>
             <a:fld id="{C0029B18-9E45-4374-8673-2D4794710B00}" type="datetimeFigureOut">
               <a:rPr lang="en-US" smtClean="0"/>
-              <a:t>3/20/2025</a:t>
+              <a:t>3/25/2025</a:t>
             </a:fld>
             <a:endParaRPr lang="en-US"/>
           </a:p>
@@ -3618,7 +3620,7 @@
           <a:p>
             <a:fld id="{C0029B18-9E45-4374-8673-2D4794710B00}" type="datetimeFigureOut">
               <a:rPr lang="en-US" smtClean="0"/>
-              <a:t>3/20/2025</a:t>
+              <a:t>3/25/2025</a:t>
             </a:fld>
             <a:endParaRPr lang="en-US"/>
           </a:p>
@@ -4624,6 +4626,342 @@
     <p:extLst>
       <p:ext uri="{BB962C8B-B14F-4D97-AF65-F5344CB8AC3E}">
         <p14:creationId xmlns:p14="http://schemas.microsoft.com/office/powerpoint/2010/main" val="466125259"/>
+      </p:ext>
+    </p:extLst>
+  </p:cSld>
+  <p:clrMapOvr>
+    <a:masterClrMapping/>
+  </p:clrMapOvr>
+</p:sld>
+</file>
+
+<file path=ppt/slides/slide12.xml><?xml version="1.0" encoding="utf-8"?>
+<p:sld xmlns:a="http://schemas.openxmlformats.org/drawingml/2006/main" xmlns:r="http://schemas.openxmlformats.org/officeDocument/2006/relationships" xmlns:p="http://schemas.openxmlformats.org/presentationml/2006/main">
+  <p:cSld>
+    <p:spTree>
+      <p:nvGrpSpPr>
+        <p:cNvPr id="1" name=""/>
+        <p:cNvGrpSpPr/>
+        <p:nvPr/>
+      </p:nvGrpSpPr>
+      <p:grpSpPr>
+        <a:xfrm>
+          <a:off x="0" y="0"/>
+          <a:ext cx="0" cy="0"/>
+          <a:chOff x="0" y="0"/>
+          <a:chExt cx="0" cy="0"/>
+        </a:xfrm>
+      </p:grpSpPr>
+      <p:pic>
+        <p:nvPicPr>
+          <p:cNvPr id="5" name="Picture 4">
+            <a:extLst>
+              <a:ext uri="{FF2B5EF4-FFF2-40B4-BE49-F238E27FC236}">
+                <a16:creationId xmlns:a16="http://schemas.microsoft.com/office/drawing/2014/main" id="{D0FAB84F-E219-17F1-0870-E90F4E7C9E48}"/>
+              </a:ext>
+            </a:extLst>
+          </p:cNvPr>
+          <p:cNvPicPr>
+            <a:picLocks noChangeAspect="1"/>
+          </p:cNvPicPr>
+          <p:nvPr/>
+        </p:nvPicPr>
+        <p:blipFill>
+          <a:blip r:embed="rId2"/>
+          <a:stretch>
+            <a:fillRect/>
+          </a:stretch>
+        </p:blipFill>
+        <p:spPr>
+          <a:xfrm>
+            <a:off x="2261652" y="1833340"/>
+            <a:ext cx="7668695" cy="3191320"/>
+          </a:xfrm>
+          <a:prstGeom prst="rect">
+            <a:avLst/>
+          </a:prstGeom>
+        </p:spPr>
+      </p:pic>
+      <p:sp>
+        <p:nvSpPr>
+          <p:cNvPr id="2" name="TextBox 1">
+            <a:extLst>
+              <a:ext uri="{FF2B5EF4-FFF2-40B4-BE49-F238E27FC236}">
+                <a16:creationId xmlns:a16="http://schemas.microsoft.com/office/drawing/2014/main" id="{B9C89399-3F24-1CE9-7483-20181A36D647}"/>
+              </a:ext>
+            </a:extLst>
+          </p:cNvPr>
+          <p:cNvSpPr txBox="1"/>
+          <p:nvPr/>
+        </p:nvSpPr>
+        <p:spPr>
+          <a:xfrm>
+            <a:off x="3725008" y="356012"/>
+            <a:ext cx="6911379" cy="1477328"/>
+          </a:xfrm>
+          <a:prstGeom prst="rect">
+            <a:avLst/>
+          </a:prstGeom>
+          <a:noFill/>
+        </p:spPr>
+        <p:txBody>
+          <a:bodyPr wrap="none" rtlCol="0">
+            <a:spAutoFit/>
+          </a:bodyPr>
+          <a:lstStyle/>
+          <a:p>
+            <a:r>
+              <a:rPr lang="en-US" dirty="0" err="1">
+                <a:hlinkClick r:id="rId3"/>
+              </a:rPr>
+              <a:t>WinDaq</a:t>
+            </a:r>
+            <a:r>
+              <a:rPr lang="en-US" dirty="0">
+                <a:hlinkClick r:id="rId3"/>
+              </a:rPr>
+              <a:t> Data Acquisition Software</a:t>
+            </a:r>
+            <a:endParaRPr lang="en-US" dirty="0"/>
+          </a:p>
+          <a:p>
+            <a:endParaRPr lang="en-US" dirty="0"/>
+          </a:p>
+          <a:p>
+            <a:r>
+              <a:rPr lang="en-US" dirty="0" err="1">
+                <a:hlinkClick r:id="rId4"/>
+              </a:rPr>
+              <a:t>PicoScope</a:t>
+            </a:r>
+            <a:r>
+              <a:rPr lang="en-US" dirty="0">
+                <a:hlinkClick r:id="rId4"/>
+              </a:rPr>
+              <a:t> oscilloscope software and </a:t>
+            </a:r>
+            <a:r>
+              <a:rPr lang="en-US" dirty="0" err="1">
+                <a:hlinkClick r:id="rId4"/>
+              </a:rPr>
+              <a:t>PicoLog</a:t>
+            </a:r>
+            <a:r>
+              <a:rPr lang="en-US" dirty="0">
+                <a:hlinkClick r:id="rId4"/>
+              </a:rPr>
+              <a:t> data logging software</a:t>
+            </a:r>
+            <a:endParaRPr lang="en-US" dirty="0"/>
+          </a:p>
+          <a:p>
+            <a:endParaRPr lang="en-US" dirty="0"/>
+          </a:p>
+          <a:p>
+            <a:r>
+              <a:rPr lang="en-US" dirty="0" err="1">
+                <a:hlinkClick r:id="rId5"/>
+              </a:rPr>
+              <a:t>Pololu</a:t>
+            </a:r>
+            <a:r>
+              <a:rPr lang="en-US" dirty="0">
+                <a:hlinkClick r:id="rId5"/>
+              </a:rPr>
+              <a:t> Simple Motor Controller 18v7 (Fully Assembled)</a:t>
+            </a:r>
+            <a:endParaRPr lang="en-US" dirty="0"/>
+          </a:p>
+        </p:txBody>
+      </p:sp>
+    </p:spTree>
+    <p:extLst>
+      <p:ext uri="{BB962C8B-B14F-4D97-AF65-F5344CB8AC3E}">
+        <p14:creationId xmlns:p14="http://schemas.microsoft.com/office/powerpoint/2010/main" val="2034331922"/>
+      </p:ext>
+    </p:extLst>
+  </p:cSld>
+  <p:clrMapOvr>
+    <a:masterClrMapping/>
+  </p:clrMapOvr>
+</p:sld>
+</file>
+
+<file path=ppt/slides/slide13.xml><?xml version="1.0" encoding="utf-8"?>
+<p:sld xmlns:a="http://schemas.openxmlformats.org/drawingml/2006/main" xmlns:r="http://schemas.openxmlformats.org/officeDocument/2006/relationships" xmlns:p="http://schemas.openxmlformats.org/presentationml/2006/main">
+  <p:cSld>
+    <p:spTree>
+      <p:nvGrpSpPr>
+        <p:cNvPr id="1" name=""/>
+        <p:cNvGrpSpPr/>
+        <p:nvPr/>
+      </p:nvGrpSpPr>
+      <p:grpSpPr>
+        <a:xfrm>
+          <a:off x="0" y="0"/>
+          <a:ext cx="0" cy="0"/>
+          <a:chOff x="0" y="0"/>
+          <a:chExt cx="0" cy="0"/>
+        </a:xfrm>
+      </p:grpSpPr>
+      <p:sp>
+        <p:nvSpPr>
+          <p:cNvPr id="2" name="Title 1">
+            <a:extLst>
+              <a:ext uri="{FF2B5EF4-FFF2-40B4-BE49-F238E27FC236}">
+                <a16:creationId xmlns:a16="http://schemas.microsoft.com/office/drawing/2014/main" id="{B43493E0-C263-BDC0-1808-A239AA365ECE}"/>
+              </a:ext>
+            </a:extLst>
+          </p:cNvPr>
+          <p:cNvSpPr>
+            <a:spLocks noGrp="1"/>
+          </p:cNvSpPr>
+          <p:nvPr>
+            <p:ph type="title"/>
+          </p:nvPr>
+        </p:nvSpPr>
+        <p:spPr/>
+        <p:txBody>
+          <a:bodyPr/>
+          <a:lstStyle/>
+          <a:p>
+            <a:endParaRPr lang="en-US"/>
+          </a:p>
+        </p:txBody>
+      </p:sp>
+      <p:sp>
+        <p:nvSpPr>
+          <p:cNvPr id="3" name="Content Placeholder 2">
+            <a:extLst>
+              <a:ext uri="{FF2B5EF4-FFF2-40B4-BE49-F238E27FC236}">
+                <a16:creationId xmlns:a16="http://schemas.microsoft.com/office/drawing/2014/main" id="{DA5C38D6-0367-2650-9BBE-B00FBAC6E25F}"/>
+              </a:ext>
+            </a:extLst>
+          </p:cNvPr>
+          <p:cNvSpPr>
+            <a:spLocks noGrp="1"/>
+          </p:cNvSpPr>
+          <p:nvPr>
+            <p:ph idx="1"/>
+          </p:nvPr>
+        </p:nvSpPr>
+        <p:spPr/>
+        <p:txBody>
+          <a:bodyPr>
+            <a:normAutofit fontScale="70000" lnSpcReduction="20000"/>
+          </a:bodyPr>
+          <a:lstStyle/>
+          <a:p>
+            <a:pPr marL="0" indent="0">
+              <a:buNone/>
+            </a:pPr>
+            <a:r>
+              <a:rPr lang="en-US" dirty="0"/>
+              <a:t>Switching between </a:t>
+            </a:r>
+            <a:r>
+              <a:rPr lang="en-US" dirty="0" err="1"/>
+              <a:t>LibUSB</a:t>
+            </a:r>
+            <a:r>
+              <a:rPr lang="en-US" dirty="0"/>
+              <a:t> and CDC Modes The native communication mode of the DI-2108-P is </a:t>
+            </a:r>
+            <a:r>
+              <a:rPr lang="en-US" dirty="0" err="1"/>
+              <a:t>LibUSB</a:t>
+            </a:r>
+            <a:r>
+              <a:rPr lang="en-US" dirty="0"/>
+              <a:t> but it can be switched to the USB CDC (Communication Device Class). CDC mode allows the USB port of DI-2108-P devices to appear like a traditional RS-232 port, which is common across most operating systems and development languages. Please note: </a:t>
+            </a:r>
+            <a:r>
+              <a:rPr lang="en-US" dirty="0" err="1"/>
+              <a:t>LibUSB</a:t>
+            </a:r>
+            <a:r>
+              <a:rPr lang="en-US" dirty="0"/>
+              <a:t> communication is required for </a:t>
+            </a:r>
+            <a:r>
+              <a:rPr lang="en-US" dirty="0" err="1"/>
+              <a:t>WinDaq</a:t>
+            </a:r>
+            <a:r>
+              <a:rPr lang="en-US" dirty="0"/>
+              <a:t> Acquisition software and programming with our .NET SDK. Only switch to CDC mode when writing your own programs at the protocol level (for example, Python applications). Use the following sequence to switch your device to/from </a:t>
+            </a:r>
+            <a:r>
+              <a:rPr lang="en-US" dirty="0" err="1"/>
+              <a:t>LibUSB</a:t>
+            </a:r>
+            <a:r>
+              <a:rPr lang="en-US" dirty="0"/>
+              <a:t>/CDC modes: </a:t>
+            </a:r>
+          </a:p>
+          <a:p>
+            <a:pPr marL="514350" indent="-514350">
+              <a:buFont typeface="+mj-lt"/>
+              <a:buAutoNum type="arabicPeriod"/>
+            </a:pPr>
+            <a:r>
+              <a:rPr lang="en-US" dirty="0"/>
+              <a:t>Connect the device to your PC via the USB port. </a:t>
+            </a:r>
+          </a:p>
+          <a:p>
+            <a:pPr marL="514350" indent="-514350">
+              <a:buFont typeface="+mj-lt"/>
+              <a:buAutoNum type="arabicPeriod"/>
+            </a:pPr>
+            <a:r>
+              <a:rPr lang="en-US" dirty="0"/>
+              <a:t>Apply power to the device. </a:t>
+            </a:r>
+          </a:p>
+          <a:p>
+            <a:pPr marL="514350" indent="-514350">
+              <a:buFont typeface="+mj-lt"/>
+              <a:buAutoNum type="arabicPeriod"/>
+            </a:pPr>
+            <a:r>
+              <a:rPr lang="en-US" dirty="0"/>
+              <a:t>When mode LED stops blinking white and is in Idle mode, push and hold the Control button. This must be completed within five seconds after the device is in Idle mode. </a:t>
+            </a:r>
+          </a:p>
+          <a:p>
+            <a:pPr marL="514350" indent="-514350">
+              <a:buFont typeface="+mj-lt"/>
+              <a:buAutoNum type="arabicPeriod"/>
+            </a:pPr>
+            <a:r>
+              <a:rPr lang="en-US" dirty="0"/>
+              <a:t>When the mode LED turns red, release the Control button. 5. The Mode LED will flash white then indicate Idle in either </a:t>
+            </a:r>
+            <a:r>
+              <a:rPr lang="en-US" dirty="0" err="1"/>
+              <a:t>LibUSB</a:t>
+            </a:r>
+            <a:r>
+              <a:rPr lang="en-US" dirty="0"/>
+              <a:t> or CDC mode: • CDC mode: Blinking Yellow • </a:t>
+            </a:r>
+            <a:r>
+              <a:rPr lang="en-US" dirty="0" err="1"/>
+              <a:t>LibUSB</a:t>
+            </a:r>
+            <a:r>
+              <a:rPr lang="en-US" dirty="0"/>
+              <a:t> mode: Blinking Green </a:t>
+            </a:r>
+          </a:p>
+        </p:txBody>
+      </p:sp>
+    </p:spTree>
+    <p:extLst>
+      <p:ext uri="{BB962C8B-B14F-4D97-AF65-F5344CB8AC3E}">
+        <p14:creationId xmlns:p14="http://schemas.microsoft.com/office/powerpoint/2010/main" val="468896425"/>
       </p:ext>
     </p:extLst>
   </p:cSld>

</xml_diff>

<commit_message>
added more test cases and pictures
</commit_message>
<xml_diff>
--- a/_4 Validation/$Qualification Test Plan/QTP PIX2.pptx
+++ b/_4 Validation/$Qualification Test Plan/QTP PIX2.pptx
@@ -5,7 +5,7 @@
     <p:sldMasterId id="2147483648" r:id="rId1"/>
   </p:sldMasterIdLst>
   <p:notesMasterIdLst>
-    <p:notesMasterId r:id="rId15"/>
+    <p:notesMasterId r:id="rId16"/>
   </p:notesMasterIdLst>
   <p:sldIdLst>
     <p:sldId id="279" r:id="rId2"/>
@@ -21,6 +21,7 @@
     <p:sldId id="282" r:id="rId12"/>
     <p:sldId id="283" r:id="rId13"/>
     <p:sldId id="284" r:id="rId14"/>
+    <p:sldId id="285" r:id="rId15"/>
   </p:sldIdLst>
   <p:sldSz cx="12192000" cy="6858000"/>
   <p:notesSz cx="6858000" cy="9144000"/>
@@ -220,7 +221,7 @@
           <a:p>
             <a:fld id="{90B77117-200D-4C24-9444-A3272AC92708}" type="datetimeFigureOut">
               <a:rPr lang="en-US" smtClean="0"/>
-              <a:t>3/25/2025</a:t>
+              <a:t>4/1/2025</a:t>
             </a:fld>
             <a:endParaRPr lang="en-US"/>
           </a:p>
@@ -970,7 +971,7 @@
           <a:p>
             <a:fld id="{C0029B18-9E45-4374-8673-2D4794710B00}" type="datetimeFigureOut">
               <a:rPr lang="en-US" smtClean="0"/>
-              <a:t>3/25/2025</a:t>
+              <a:t>4/1/2025</a:t>
             </a:fld>
             <a:endParaRPr lang="en-US"/>
           </a:p>
@@ -1168,7 +1169,7 @@
           <a:p>
             <a:fld id="{C0029B18-9E45-4374-8673-2D4794710B00}" type="datetimeFigureOut">
               <a:rPr lang="en-US" smtClean="0"/>
-              <a:t>3/25/2025</a:t>
+              <a:t>4/1/2025</a:t>
             </a:fld>
             <a:endParaRPr lang="en-US"/>
           </a:p>
@@ -1376,7 +1377,7 @@
           <a:p>
             <a:fld id="{C0029B18-9E45-4374-8673-2D4794710B00}" type="datetimeFigureOut">
               <a:rPr lang="en-US" smtClean="0"/>
-              <a:t>3/25/2025</a:t>
+              <a:t>4/1/2025</a:t>
             </a:fld>
             <a:endParaRPr lang="en-US"/>
           </a:p>
@@ -1574,7 +1575,7 @@
           <a:p>
             <a:fld id="{C0029B18-9E45-4374-8673-2D4794710B00}" type="datetimeFigureOut">
               <a:rPr lang="en-US" smtClean="0"/>
-              <a:t>3/25/2025</a:t>
+              <a:t>4/1/2025</a:t>
             </a:fld>
             <a:endParaRPr lang="en-US"/>
           </a:p>
@@ -1849,7 +1850,7 @@
           <a:p>
             <a:fld id="{C0029B18-9E45-4374-8673-2D4794710B00}" type="datetimeFigureOut">
               <a:rPr lang="en-US" smtClean="0"/>
-              <a:t>3/25/2025</a:t>
+              <a:t>4/1/2025</a:t>
             </a:fld>
             <a:endParaRPr lang="en-US"/>
           </a:p>
@@ -2114,7 +2115,7 @@
           <a:p>
             <a:fld id="{C0029B18-9E45-4374-8673-2D4794710B00}" type="datetimeFigureOut">
               <a:rPr lang="en-US" smtClean="0"/>
-              <a:t>3/25/2025</a:t>
+              <a:t>4/1/2025</a:t>
             </a:fld>
             <a:endParaRPr lang="en-US"/>
           </a:p>
@@ -2526,7 +2527,7 @@
           <a:p>
             <a:fld id="{C0029B18-9E45-4374-8673-2D4794710B00}" type="datetimeFigureOut">
               <a:rPr lang="en-US" smtClean="0"/>
-              <a:t>3/25/2025</a:t>
+              <a:t>4/1/2025</a:t>
             </a:fld>
             <a:endParaRPr lang="en-US"/>
           </a:p>
@@ -2667,7 +2668,7 @@
           <a:p>
             <a:fld id="{C0029B18-9E45-4374-8673-2D4794710B00}" type="datetimeFigureOut">
               <a:rPr lang="en-US" smtClean="0"/>
-              <a:t>3/25/2025</a:t>
+              <a:t>4/1/2025</a:t>
             </a:fld>
             <a:endParaRPr lang="en-US"/>
           </a:p>
@@ -2780,7 +2781,7 @@
           <a:p>
             <a:fld id="{C0029B18-9E45-4374-8673-2D4794710B00}" type="datetimeFigureOut">
               <a:rPr lang="en-US" smtClean="0"/>
-              <a:t>3/25/2025</a:t>
+              <a:t>4/1/2025</a:t>
             </a:fld>
             <a:endParaRPr lang="en-US"/>
           </a:p>
@@ -3091,7 +3092,7 @@
           <a:p>
             <a:fld id="{C0029B18-9E45-4374-8673-2D4794710B00}" type="datetimeFigureOut">
               <a:rPr lang="en-US" smtClean="0"/>
-              <a:t>3/25/2025</a:t>
+              <a:t>4/1/2025</a:t>
             </a:fld>
             <a:endParaRPr lang="en-US"/>
           </a:p>
@@ -3379,7 +3380,7 @@
           <a:p>
             <a:fld id="{C0029B18-9E45-4374-8673-2D4794710B00}" type="datetimeFigureOut">
               <a:rPr lang="en-US" smtClean="0"/>
-              <a:t>3/25/2025</a:t>
+              <a:t>4/1/2025</a:t>
             </a:fld>
             <a:endParaRPr lang="en-US"/>
           </a:p>
@@ -3620,7 +3621,7 @@
           <a:p>
             <a:fld id="{C0029B18-9E45-4374-8673-2D4794710B00}" type="datetimeFigureOut">
               <a:rPr lang="en-US" smtClean="0"/>
-              <a:t>3/25/2025</a:t>
+              <a:t>4/1/2025</a:t>
             </a:fld>
             <a:endParaRPr lang="en-US"/>
           </a:p>
@@ -4962,6 +4963,94 @@
     <p:extLst>
       <p:ext uri="{BB962C8B-B14F-4D97-AF65-F5344CB8AC3E}">
         <p14:creationId xmlns:p14="http://schemas.microsoft.com/office/powerpoint/2010/main" val="468896425"/>
+      </p:ext>
+    </p:extLst>
+  </p:cSld>
+  <p:clrMapOvr>
+    <a:masterClrMapping/>
+  </p:clrMapOvr>
+</p:sld>
+</file>
+
+<file path=ppt/slides/slide14.xml><?xml version="1.0" encoding="utf-8"?>
+<p:sld xmlns:a="http://schemas.openxmlformats.org/drawingml/2006/main" xmlns:r="http://schemas.openxmlformats.org/officeDocument/2006/relationships" xmlns:p="http://schemas.openxmlformats.org/presentationml/2006/main">
+  <p:cSld>
+    <p:spTree>
+      <p:nvGrpSpPr>
+        <p:cNvPr id="1" name=""/>
+        <p:cNvGrpSpPr/>
+        <p:nvPr/>
+      </p:nvGrpSpPr>
+      <p:grpSpPr>
+        <a:xfrm>
+          <a:off x="0" y="0"/>
+          <a:ext cx="0" cy="0"/>
+          <a:chOff x="0" y="0"/>
+          <a:chExt cx="0" cy="0"/>
+        </a:xfrm>
+      </p:grpSpPr>
+      <p:sp>
+        <p:nvSpPr>
+          <p:cNvPr id="2" name="Title 1">
+            <a:extLst>
+              <a:ext uri="{FF2B5EF4-FFF2-40B4-BE49-F238E27FC236}">
+                <a16:creationId xmlns:a16="http://schemas.microsoft.com/office/drawing/2014/main" id="{E4A6B072-4214-D493-B318-094F83C2786F}"/>
+              </a:ext>
+            </a:extLst>
+          </p:cNvPr>
+          <p:cNvSpPr>
+            <a:spLocks noGrp="1"/>
+          </p:cNvSpPr>
+          <p:nvPr>
+            <p:ph type="title"/>
+          </p:nvPr>
+        </p:nvSpPr>
+        <p:spPr/>
+        <p:txBody>
+          <a:bodyPr/>
+          <a:lstStyle/>
+          <a:p>
+            <a:r>
+              <a:rPr lang="en-US" dirty="0"/>
+              <a:t>Fluke mA 3/28 to 4/1 </a:t>
+            </a:r>
+          </a:p>
+        </p:txBody>
+      </p:sp>
+      <p:pic>
+        <p:nvPicPr>
+          <p:cNvPr id="5" name="Picture 4">
+            <a:extLst>
+              <a:ext uri="{FF2B5EF4-FFF2-40B4-BE49-F238E27FC236}">
+                <a16:creationId xmlns:a16="http://schemas.microsoft.com/office/drawing/2014/main" id="{20114FE4-DF26-2D3B-D1F1-1B2A77132637}"/>
+              </a:ext>
+            </a:extLst>
+          </p:cNvPr>
+          <p:cNvPicPr>
+            <a:picLocks noChangeAspect="1"/>
+          </p:cNvPicPr>
+          <p:nvPr/>
+        </p:nvPicPr>
+        <p:blipFill>
+          <a:blip r:embed="rId2"/>
+          <a:stretch>
+            <a:fillRect/>
+          </a:stretch>
+        </p:blipFill>
+        <p:spPr>
+          <a:xfrm>
+            <a:off x="1437338" y="1690688"/>
+            <a:ext cx="7964011" cy="4791744"/>
+          </a:xfrm>
+          <a:prstGeom prst="rect">
+            <a:avLst/>
+          </a:prstGeom>
+        </p:spPr>
+      </p:pic>
+    </p:spTree>
+    <p:extLst>
+      <p:ext uri="{BB962C8B-B14F-4D97-AF65-F5344CB8AC3E}">
+        <p14:creationId xmlns:p14="http://schemas.microsoft.com/office/powerpoint/2010/main" val="982617066"/>
       </p:ext>
     </p:extLst>
   </p:cSld>

</xml_diff>